<commit_message>
structural layout as discussed on sunday - iterative development
</commit_message>
<xml_diff>
--- a/doc/uist14/figures/selectflow.pptx
+++ b/doc/uist14/figures/selectflow.pptx
@@ -6,6 +6,7 @@
   </p:sldMasterIdLst>
   <p:sldIdLst>
     <p:sldId id="257" r:id="rId2"/>
+    <p:sldId id="258" r:id="rId3"/>
   </p:sldIdLst>
   <p:sldSz cx="9144000" cy="6858000" type="screen4x3"/>
   <p:notesSz cx="6858000" cy="9144000"/>
@@ -3103,8 +3104,8 @@
         </p:nvSpPr>
         <p:spPr>
           <a:xfrm>
-            <a:off x="4497443" y="1629538"/>
-            <a:ext cx="4597897" cy="3956763"/>
+            <a:off x="4497443" y="2333908"/>
+            <a:ext cx="4597897" cy="2856513"/>
           </a:xfrm>
           <a:prstGeom prst="rect">
             <a:avLst/>
@@ -3297,8 +3298,8 @@
         </p:nvSpPr>
         <p:spPr>
           <a:xfrm>
-            <a:off x="4788689" y="1819075"/>
-            <a:ext cx="1716399" cy="1071068"/>
+            <a:off x="4706219" y="2412895"/>
+            <a:ext cx="2220948" cy="1071068"/>
           </a:xfrm>
           <a:prstGeom prst="flowChartDecision">
             <a:avLst/>
@@ -3325,7 +3326,19 @@
             <a:pPr algn="ctr"/>
             <a:r>
               <a:rPr lang="en-US" sz="1400" dirty="0" smtClean="0"/>
-              <a:t>Single target received IR?</a:t>
+              <a:t>Single </a:t>
+            </a:r>
+            <a:r>
+              <a:rPr lang="en-US" sz="1400" dirty="0" smtClean="0"/>
+              <a:t>target received </a:t>
+            </a:r>
+            <a:r>
+              <a:rPr lang="en-US" sz="1400" smtClean="0"/>
+              <a:t>IR</a:t>
+            </a:r>
+            <a:r>
+              <a:rPr lang="en-US" sz="1400" smtClean="0"/>
+              <a:t>?</a:t>
             </a:r>
             <a:endParaRPr lang="en-US" sz="1400" dirty="0"/>
           </a:p>
@@ -3339,8 +3352,8 @@
         </p:nvSpPr>
         <p:spPr>
           <a:xfrm>
-            <a:off x="7009637" y="4218063"/>
-            <a:ext cx="1640912" cy="449755"/>
+            <a:off x="7009637" y="3666075"/>
+            <a:ext cx="1640912" cy="605863"/>
           </a:xfrm>
           <a:prstGeom prst="rect">
             <a:avLst/>
@@ -3367,7 +3380,18 @@
             <a:pPr algn="ctr"/>
             <a:r>
               <a:rPr lang="en-US" sz="1400" dirty="0" smtClean="0"/>
-              <a:t>Disambiguation UI</a:t>
+              <a:t>Disambiguation </a:t>
+            </a:r>
+            <a:r>
+              <a:rPr lang="en-US" sz="1400" dirty="0" smtClean="0"/>
+              <a:t>UI</a:t>
+            </a:r>
+          </a:p>
+          <a:p>
+            <a:pPr algn="ctr"/>
+            <a:r>
+              <a:rPr lang="en-US" sz="1400" dirty="0" smtClean="0"/>
+              <a:t>(alphabetical)</a:t>
             </a:r>
             <a:endParaRPr lang="en-US" sz="1400" dirty="0"/>
           </a:p>
@@ -3375,16 +3399,1091 @@
       </p:sp>
       <p:sp>
         <p:nvSpPr>
-          <p:cNvPr id="5" name="Decision 4"/>
+          <p:cNvPr id="6" name="Rectangle 5"/>
           <p:cNvSpPr/>
           <p:nvPr/>
         </p:nvSpPr>
         <p:spPr>
           <a:xfrm>
-            <a:off x="5801881" y="3085849"/>
-            <a:ext cx="2175983" cy="750031"/>
+            <a:off x="5108104" y="4543829"/>
+            <a:ext cx="1376489" cy="483201"/>
+          </a:xfrm>
+          <a:prstGeom prst="rect">
+            <a:avLst/>
+          </a:prstGeom>
+        </p:spPr>
+        <p:style>
+          <a:lnRef idx="1">
+            <a:schemeClr val="dk1"/>
+          </a:lnRef>
+          <a:fillRef idx="2">
+            <a:schemeClr val="dk1"/>
+          </a:fillRef>
+          <a:effectRef idx="1">
+            <a:schemeClr val="dk1"/>
+          </a:effectRef>
+          <a:fontRef idx="minor">
+            <a:schemeClr val="dk1"/>
+          </a:fontRef>
+        </p:style>
+        <p:txBody>
+          <a:bodyPr rtlCol="0" anchor="ctr"/>
+          <a:lstStyle/>
+          <a:p>
+            <a:pPr algn="ctr"/>
+            <a:r>
+              <a:rPr lang="en-US" sz="1400" dirty="0" smtClean="0"/>
+              <a:t>Select Target</a:t>
+            </a:r>
+            <a:endParaRPr lang="en-US" sz="1400" dirty="0"/>
+          </a:p>
+        </p:txBody>
+      </p:sp>
+      <p:cxnSp>
+        <p:nvCxnSpPr>
+          <p:cNvPr id="8" name="Elbow Connector 7"/>
+          <p:cNvCxnSpPr>
+            <a:stCxn id="3" idx="2"/>
+            <a:endCxn id="4" idx="0"/>
+          </p:cNvCxnSpPr>
+          <p:nvPr/>
+        </p:nvCxnSpPr>
+        <p:spPr>
+          <a:xfrm rot="16200000" flipH="1">
+            <a:off x="6732337" y="2568319"/>
+            <a:ext cx="182112" cy="2013400"/>
+          </a:xfrm>
+          <a:prstGeom prst="bentConnector3">
+            <a:avLst/>
+          </a:prstGeom>
+          <a:ln>
+            <a:tailEnd type="arrow"/>
+          </a:ln>
+        </p:spPr>
+        <p:style>
+          <a:lnRef idx="2">
+            <a:schemeClr val="accent1"/>
+          </a:lnRef>
+          <a:fillRef idx="0">
+            <a:schemeClr val="accent1"/>
+          </a:fillRef>
+          <a:effectRef idx="1">
+            <a:schemeClr val="accent1"/>
+          </a:effectRef>
+          <a:fontRef idx="minor">
+            <a:schemeClr val="tx1"/>
+          </a:fontRef>
+        </p:style>
+      </p:cxnSp>
+      <p:sp>
+        <p:nvSpPr>
+          <p:cNvPr id="9" name="TextBox 8"/>
+          <p:cNvSpPr txBox="1"/>
+          <p:nvPr/>
+        </p:nvSpPr>
+        <p:spPr>
+          <a:xfrm>
+            <a:off x="6034471" y="3277364"/>
+            <a:ext cx="453970" cy="307777"/>
+          </a:xfrm>
+          <a:prstGeom prst="rect">
+            <a:avLst/>
+          </a:prstGeom>
+          <a:noFill/>
+        </p:spPr>
+        <p:txBody>
+          <a:bodyPr wrap="none" rtlCol="0">
+            <a:spAutoFit/>
+          </a:bodyPr>
+          <a:lstStyle/>
+          <a:p>
+            <a:r>
+              <a:rPr lang="en-US" sz="1400" dirty="0" smtClean="0"/>
+              <a:t>NO</a:t>
+            </a:r>
+            <a:endParaRPr lang="en-US" sz="1400" dirty="0"/>
+          </a:p>
+        </p:txBody>
+      </p:sp>
+      <p:cxnSp>
+        <p:nvCxnSpPr>
+          <p:cNvPr id="11" name="Elbow Connector 10"/>
+          <p:cNvCxnSpPr>
+            <a:stCxn id="4" idx="2"/>
+            <a:endCxn id="6" idx="0"/>
+          </p:cNvCxnSpPr>
+          <p:nvPr/>
+        </p:nvCxnSpPr>
+        <p:spPr>
+          <a:xfrm rot="5400000">
+            <a:off x="6677276" y="3391011"/>
+            <a:ext cx="271891" cy="2033744"/>
+          </a:xfrm>
+          <a:prstGeom prst="bentConnector3">
+            <a:avLst>
+              <a:gd name="adj1" fmla="val 50000"/>
+            </a:avLst>
+          </a:prstGeom>
+          <a:ln>
+            <a:tailEnd type="arrow"/>
+          </a:ln>
+        </p:spPr>
+        <p:style>
+          <a:lnRef idx="2">
+            <a:schemeClr val="accent1"/>
+          </a:lnRef>
+          <a:fillRef idx="0">
+            <a:schemeClr val="accent1"/>
+          </a:fillRef>
+          <a:effectRef idx="1">
+            <a:schemeClr val="accent1"/>
+          </a:effectRef>
+          <a:fontRef idx="minor">
+            <a:schemeClr val="tx1"/>
+          </a:fontRef>
+        </p:style>
+      </p:cxnSp>
+      <p:sp>
+        <p:nvSpPr>
+          <p:cNvPr id="12" name="TextBox 11"/>
+          <p:cNvSpPr txBox="1"/>
+          <p:nvPr/>
+        </p:nvSpPr>
+        <p:spPr>
+          <a:xfrm>
+            <a:off x="6542044" y="4374552"/>
+            <a:ext cx="1232604" cy="307777"/>
+          </a:xfrm>
+          <a:prstGeom prst="rect">
+            <a:avLst/>
+          </a:prstGeom>
+          <a:noFill/>
+        </p:spPr>
+        <p:txBody>
+          <a:bodyPr wrap="none" rtlCol="0">
+            <a:spAutoFit/>
+          </a:bodyPr>
+          <a:lstStyle/>
+          <a:p>
+            <a:r>
+              <a:rPr lang="en-US" sz="1400" dirty="0" smtClean="0"/>
+              <a:t>Tap selection</a:t>
+            </a:r>
+            <a:endParaRPr lang="en-US" sz="1400" dirty="0"/>
+          </a:p>
+        </p:txBody>
+      </p:sp>
+      <p:cxnSp>
+        <p:nvCxnSpPr>
+          <p:cNvPr id="14" name="Elbow Connector 13"/>
+          <p:cNvCxnSpPr>
+            <a:stCxn id="4" idx="3"/>
+            <a:endCxn id="4" idx="0"/>
+          </p:cNvCxnSpPr>
+          <p:nvPr/>
+        </p:nvCxnSpPr>
+        <p:spPr>
+          <a:xfrm flipH="1" flipV="1">
+            <a:off x="7830093" y="3666075"/>
+            <a:ext cx="820456" cy="302932"/>
+          </a:xfrm>
+          <a:prstGeom prst="bentConnector4">
+            <a:avLst>
+              <a:gd name="adj1" fmla="val -27863"/>
+              <a:gd name="adj2" fmla="val 131900"/>
+            </a:avLst>
+          </a:prstGeom>
+          <a:ln>
+            <a:tailEnd type="arrow"/>
+          </a:ln>
+        </p:spPr>
+        <p:style>
+          <a:lnRef idx="2">
+            <a:schemeClr val="accent1"/>
+          </a:lnRef>
+          <a:fillRef idx="0">
+            <a:schemeClr val="accent1"/>
+          </a:fillRef>
+          <a:effectRef idx="1">
+            <a:schemeClr val="accent1"/>
+          </a:effectRef>
+          <a:fontRef idx="minor">
+            <a:schemeClr val="tx1"/>
+          </a:fontRef>
+        </p:style>
+      </p:cxnSp>
+      <p:sp>
+        <p:nvSpPr>
+          <p:cNvPr id="15" name="TextBox 14"/>
+          <p:cNvSpPr txBox="1"/>
+          <p:nvPr/>
+        </p:nvSpPr>
+        <p:spPr>
+          <a:xfrm>
+            <a:off x="7971166" y="2897979"/>
+            <a:ext cx="893256" cy="523220"/>
+          </a:xfrm>
+          <a:prstGeom prst="rect">
+            <a:avLst/>
+          </a:prstGeom>
+          <a:noFill/>
+        </p:spPr>
+        <p:txBody>
+          <a:bodyPr wrap="none" rtlCol="0">
+            <a:spAutoFit/>
+          </a:bodyPr>
+          <a:lstStyle/>
+          <a:p>
+            <a:r>
+              <a:rPr lang="en-US" sz="1400" dirty="0" smtClean="0"/>
+              <a:t>Change </a:t>
+            </a:r>
+          </a:p>
+          <a:p>
+            <a:r>
+              <a:rPr lang="en-US" sz="1400" dirty="0" smtClean="0"/>
+              <a:t>selection</a:t>
+            </a:r>
+            <a:endParaRPr lang="en-US" sz="1400" dirty="0"/>
+          </a:p>
+        </p:txBody>
+      </p:sp>
+      <p:cxnSp>
+        <p:nvCxnSpPr>
+          <p:cNvPr id="25" name="Straight Arrow Connector 24"/>
+          <p:cNvCxnSpPr>
+            <a:stCxn id="3" idx="2"/>
+            <a:endCxn id="6" idx="0"/>
+          </p:cNvCxnSpPr>
+          <p:nvPr/>
+        </p:nvCxnSpPr>
+        <p:spPr>
+          <a:xfrm flipH="1">
+            <a:off x="5796349" y="3483963"/>
+            <a:ext cx="20344" cy="1059866"/>
+          </a:xfrm>
+          <a:prstGeom prst="straightConnector1">
+            <a:avLst/>
+          </a:prstGeom>
+          <a:ln>
+            <a:tailEnd type="arrow"/>
+          </a:ln>
+        </p:spPr>
+        <p:style>
+          <a:lnRef idx="2">
+            <a:schemeClr val="accent1"/>
+          </a:lnRef>
+          <a:fillRef idx="0">
+            <a:schemeClr val="accent1"/>
+          </a:fillRef>
+          <a:effectRef idx="1">
+            <a:schemeClr val="accent1"/>
+          </a:effectRef>
+          <a:fontRef idx="minor">
+            <a:schemeClr val="tx1"/>
+          </a:fontRef>
+        </p:style>
+      </p:cxnSp>
+      <p:sp>
+        <p:nvSpPr>
+          <p:cNvPr id="26" name="TextBox 25"/>
+          <p:cNvSpPr txBox="1"/>
+          <p:nvPr/>
+        </p:nvSpPr>
+        <p:spPr>
+          <a:xfrm>
+            <a:off x="4919052" y="3299355"/>
+            <a:ext cx="543914" cy="307777"/>
+          </a:xfrm>
+          <a:prstGeom prst="rect">
+            <a:avLst/>
+          </a:prstGeom>
+          <a:noFill/>
+        </p:spPr>
+        <p:txBody>
+          <a:bodyPr wrap="none" rtlCol="0">
+            <a:spAutoFit/>
+          </a:bodyPr>
+          <a:lstStyle/>
+          <a:p>
+            <a:r>
+              <a:rPr lang="en-US" sz="1400" dirty="0" smtClean="0"/>
+              <a:t>YES</a:t>
+            </a:r>
+            <a:endParaRPr lang="en-US" sz="1400" dirty="0"/>
+          </a:p>
+        </p:txBody>
+      </p:sp>
+      <p:sp>
+        <p:nvSpPr>
+          <p:cNvPr id="27" name="Rectangle 26"/>
+          <p:cNvSpPr/>
+          <p:nvPr/>
+        </p:nvSpPr>
+        <p:spPr>
+          <a:xfrm>
+            <a:off x="2125581" y="3829418"/>
+            <a:ext cx="1391853" cy="512427"/>
+          </a:xfrm>
+          <a:prstGeom prst="rect">
+            <a:avLst/>
+          </a:prstGeom>
+        </p:spPr>
+        <p:style>
+          <a:lnRef idx="1">
+            <a:schemeClr val="dk1"/>
+          </a:lnRef>
+          <a:fillRef idx="2">
+            <a:schemeClr val="dk1"/>
+          </a:fillRef>
+          <a:effectRef idx="1">
+            <a:schemeClr val="dk1"/>
+          </a:effectRef>
+          <a:fontRef idx="minor">
+            <a:schemeClr val="dk1"/>
+          </a:fontRef>
+        </p:style>
+        <p:txBody>
+          <a:bodyPr rtlCol="0" anchor="ctr"/>
+          <a:lstStyle/>
+          <a:p>
+            <a:pPr algn="ctr"/>
+            <a:r>
+              <a:rPr lang="en-US" sz="1400" dirty="0" smtClean="0"/>
+              <a:t>Feedback OFF</a:t>
+            </a:r>
+            <a:endParaRPr lang="en-US" sz="1400" dirty="0"/>
+          </a:p>
+        </p:txBody>
+      </p:sp>
+      <p:sp>
+        <p:nvSpPr>
+          <p:cNvPr id="28" name="Rectangle 27"/>
+          <p:cNvSpPr/>
+          <p:nvPr/>
+        </p:nvSpPr>
+        <p:spPr>
+          <a:xfrm>
+            <a:off x="326115" y="3794487"/>
+            <a:ext cx="1355935" cy="512427"/>
+          </a:xfrm>
+          <a:prstGeom prst="rect">
+            <a:avLst/>
+          </a:prstGeom>
+        </p:spPr>
+        <p:style>
+          <a:lnRef idx="1">
+            <a:schemeClr val="dk1"/>
+          </a:lnRef>
+          <a:fillRef idx="2">
+            <a:schemeClr val="dk1"/>
+          </a:fillRef>
+          <a:effectRef idx="1">
+            <a:schemeClr val="dk1"/>
+          </a:effectRef>
+          <a:fontRef idx="minor">
+            <a:schemeClr val="dk1"/>
+          </a:fontRef>
+        </p:style>
+        <p:txBody>
+          <a:bodyPr rtlCol="0" anchor="ctr"/>
+          <a:lstStyle/>
+          <a:p>
+            <a:pPr algn="ctr"/>
+            <a:r>
+              <a:rPr lang="en-US" sz="1400" dirty="0" smtClean="0"/>
+              <a:t>Feedback ON</a:t>
+            </a:r>
+            <a:endParaRPr lang="en-US" sz="1400" dirty="0"/>
+          </a:p>
+        </p:txBody>
+      </p:sp>
+      <p:cxnSp>
+        <p:nvCxnSpPr>
+          <p:cNvPr id="30" name="Elbow Connector 29"/>
+          <p:cNvCxnSpPr>
+            <a:stCxn id="2" idx="2"/>
+            <a:endCxn id="28" idx="0"/>
+          </p:cNvCxnSpPr>
+          <p:nvPr/>
+        </p:nvCxnSpPr>
+        <p:spPr>
+          <a:xfrm rot="5400000">
+            <a:off x="1354387" y="3230807"/>
+            <a:ext cx="213376" cy="913984"/>
+          </a:xfrm>
+          <a:prstGeom prst="bentConnector3">
+            <a:avLst/>
+          </a:prstGeom>
+          <a:ln>
+            <a:tailEnd type="arrow"/>
+          </a:ln>
+        </p:spPr>
+        <p:style>
+          <a:lnRef idx="2">
+            <a:schemeClr val="accent1"/>
+          </a:lnRef>
+          <a:fillRef idx="0">
+            <a:schemeClr val="accent1"/>
+          </a:fillRef>
+          <a:effectRef idx="1">
+            <a:schemeClr val="accent1"/>
+          </a:effectRef>
+          <a:fontRef idx="minor">
+            <a:schemeClr val="tx1"/>
+          </a:fontRef>
+        </p:style>
+      </p:cxnSp>
+      <p:sp>
+        <p:nvSpPr>
+          <p:cNvPr id="31" name="TextBox 30"/>
+          <p:cNvSpPr txBox="1"/>
+          <p:nvPr/>
+        </p:nvSpPr>
+        <p:spPr>
+          <a:xfrm>
+            <a:off x="669395" y="3323696"/>
+            <a:ext cx="543914" cy="307777"/>
+          </a:xfrm>
+          <a:prstGeom prst="rect">
+            <a:avLst/>
+          </a:prstGeom>
+          <a:noFill/>
+        </p:spPr>
+        <p:txBody>
+          <a:bodyPr wrap="none" rtlCol="0">
+            <a:spAutoFit/>
+          </a:bodyPr>
+          <a:lstStyle/>
+          <a:p>
+            <a:r>
+              <a:rPr lang="en-US" sz="1400" dirty="0" smtClean="0"/>
+              <a:t>YES</a:t>
+            </a:r>
+            <a:endParaRPr lang="en-US" sz="1400" dirty="0"/>
+          </a:p>
+        </p:txBody>
+      </p:sp>
+      <p:cxnSp>
+        <p:nvCxnSpPr>
+          <p:cNvPr id="33" name="Elbow Connector 32"/>
+          <p:cNvCxnSpPr>
+            <a:stCxn id="28" idx="2"/>
+            <a:endCxn id="2" idx="0"/>
+          </p:cNvCxnSpPr>
+          <p:nvPr/>
+        </p:nvCxnSpPr>
+        <p:spPr>
+          <a:xfrm rot="5400000" flipH="1" flipV="1">
+            <a:off x="736728" y="3125576"/>
+            <a:ext cx="1448693" cy="913984"/>
+          </a:xfrm>
+          <a:prstGeom prst="bentConnector5">
+            <a:avLst>
+              <a:gd name="adj1" fmla="val -15780"/>
+              <a:gd name="adj2" fmla="val -87688"/>
+              <a:gd name="adj3" fmla="val 115780"/>
+            </a:avLst>
+          </a:prstGeom>
+          <a:ln>
+            <a:tailEnd type="arrow"/>
+          </a:ln>
+        </p:spPr>
+        <p:style>
+          <a:lnRef idx="2">
+            <a:schemeClr val="accent1"/>
+          </a:lnRef>
+          <a:fillRef idx="0">
+            <a:schemeClr val="accent1"/>
+          </a:fillRef>
+          <a:effectRef idx="1">
+            <a:schemeClr val="accent1"/>
+          </a:effectRef>
+          <a:fontRef idx="minor">
+            <a:schemeClr val="tx1"/>
+          </a:fontRef>
+        </p:style>
+      </p:cxnSp>
+      <p:cxnSp>
+        <p:nvCxnSpPr>
+          <p:cNvPr id="36" name="Elbow Connector 35"/>
+          <p:cNvCxnSpPr>
+            <a:stCxn id="2" idx="2"/>
+            <a:endCxn id="27" idx="0"/>
+          </p:cNvCxnSpPr>
+          <p:nvPr/>
+        </p:nvCxnSpPr>
+        <p:spPr>
+          <a:xfrm rot="16200000" flipH="1">
+            <a:off x="2245634" y="3253543"/>
+            <a:ext cx="248307" cy="903441"/>
+          </a:xfrm>
+          <a:prstGeom prst="bentConnector3">
+            <a:avLst/>
+          </a:prstGeom>
+          <a:ln>
+            <a:tailEnd type="arrow"/>
+          </a:ln>
+        </p:spPr>
+        <p:style>
+          <a:lnRef idx="2">
+            <a:schemeClr val="accent1"/>
+          </a:lnRef>
+          <a:fillRef idx="0">
+            <a:schemeClr val="accent1"/>
+          </a:fillRef>
+          <a:effectRef idx="1">
+            <a:schemeClr val="accent1"/>
+          </a:effectRef>
+          <a:fontRef idx="minor">
+            <a:schemeClr val="tx1"/>
+          </a:fontRef>
+        </p:style>
+      </p:cxnSp>
+      <p:sp>
+        <p:nvSpPr>
+          <p:cNvPr id="37" name="TextBox 36"/>
+          <p:cNvSpPr txBox="1"/>
+          <p:nvPr/>
+        </p:nvSpPr>
+        <p:spPr>
+          <a:xfrm>
+            <a:off x="2306022" y="3393460"/>
+            <a:ext cx="453970" cy="307777"/>
+          </a:xfrm>
+          <a:prstGeom prst="rect">
+            <a:avLst/>
+          </a:prstGeom>
+          <a:noFill/>
+        </p:spPr>
+        <p:txBody>
+          <a:bodyPr wrap="none" rtlCol="0">
+            <a:spAutoFit/>
+          </a:bodyPr>
+          <a:lstStyle/>
+          <a:p>
+            <a:r>
+              <a:rPr lang="en-US" sz="1400" dirty="0" smtClean="0"/>
+              <a:t>NO</a:t>
+            </a:r>
+            <a:endParaRPr lang="en-US" sz="1400" dirty="0"/>
+          </a:p>
+        </p:txBody>
+      </p:sp>
+      <p:cxnSp>
+        <p:nvCxnSpPr>
+          <p:cNvPr id="39" name="Elbow Connector 38"/>
+          <p:cNvCxnSpPr>
+            <a:stCxn id="27" idx="2"/>
+            <a:endCxn id="2" idx="0"/>
+          </p:cNvCxnSpPr>
+          <p:nvPr/>
+        </p:nvCxnSpPr>
+        <p:spPr>
+          <a:xfrm rot="5400000" flipH="1">
+            <a:off x="1627976" y="3148313"/>
+            <a:ext cx="1483624" cy="903441"/>
+          </a:xfrm>
+          <a:prstGeom prst="bentConnector5">
+            <a:avLst>
+              <a:gd name="adj1" fmla="val -15408"/>
+              <a:gd name="adj2" fmla="val -86078"/>
+              <a:gd name="adj3" fmla="val 115408"/>
+            </a:avLst>
+          </a:prstGeom>
+          <a:ln>
+            <a:tailEnd type="arrow"/>
+          </a:ln>
+        </p:spPr>
+        <p:style>
+          <a:lnRef idx="2">
+            <a:schemeClr val="accent1"/>
+          </a:lnRef>
+          <a:fillRef idx="0">
+            <a:schemeClr val="accent1"/>
+          </a:fillRef>
+          <a:effectRef idx="1">
+            <a:schemeClr val="accent1"/>
+          </a:effectRef>
+          <a:fontRef idx="minor">
+            <a:schemeClr val="tx1"/>
+          </a:fontRef>
+        </p:style>
+      </p:cxnSp>
+      <p:sp>
+        <p:nvSpPr>
+          <p:cNvPr id="84" name="TextBox 83"/>
+          <p:cNvSpPr txBox="1"/>
+          <p:nvPr/>
+        </p:nvSpPr>
+        <p:spPr>
+          <a:xfrm>
+            <a:off x="1187566" y="5343488"/>
+            <a:ext cx="1402848" cy="369332"/>
+          </a:xfrm>
+          <a:prstGeom prst="rect">
+            <a:avLst/>
+          </a:prstGeom>
+          <a:noFill/>
+        </p:spPr>
+        <p:txBody>
+          <a:bodyPr wrap="none" rtlCol="0">
+            <a:spAutoFit/>
+          </a:bodyPr>
+          <a:lstStyle/>
+          <a:p>
+            <a:pPr algn="ctr"/>
+            <a:r>
+              <a:rPr lang="en-US" b="1" dirty="0" smtClean="0"/>
+              <a:t>TRACKING</a:t>
+            </a:r>
+            <a:endParaRPr lang="en-US" b="1" dirty="0"/>
+          </a:p>
+        </p:txBody>
+      </p:sp>
+      <p:cxnSp>
+        <p:nvCxnSpPr>
+          <p:cNvPr id="94" name="Straight Arrow Connector 93"/>
+          <p:cNvCxnSpPr>
+            <a:endCxn id="92" idx="1"/>
+          </p:cNvCxnSpPr>
+          <p:nvPr/>
+        </p:nvCxnSpPr>
+        <p:spPr>
+          <a:xfrm>
+            <a:off x="3793195" y="3762165"/>
+            <a:ext cx="704248" cy="0"/>
+          </a:xfrm>
+          <a:prstGeom prst="straightConnector1">
+            <a:avLst/>
+          </a:prstGeom>
+          <a:ln>
+            <a:tailEnd type="arrow"/>
+          </a:ln>
+        </p:spPr>
+        <p:style>
+          <a:lnRef idx="2">
+            <a:schemeClr val="accent1"/>
+          </a:lnRef>
+          <a:fillRef idx="0">
+            <a:schemeClr val="accent1"/>
+          </a:fillRef>
+          <a:effectRef idx="1">
+            <a:schemeClr val="accent1"/>
+          </a:effectRef>
+          <a:fontRef idx="minor">
+            <a:schemeClr val="tx1"/>
+          </a:fontRef>
+        </p:style>
+      </p:cxnSp>
+      <p:sp>
+        <p:nvSpPr>
+          <p:cNvPr id="95" name="TextBox 94"/>
+          <p:cNvSpPr txBox="1"/>
+          <p:nvPr/>
+        </p:nvSpPr>
+        <p:spPr>
+          <a:xfrm>
+            <a:off x="6178979" y="5317378"/>
+            <a:ext cx="1505641" cy="369332"/>
+          </a:xfrm>
+          <a:prstGeom prst="rect">
+            <a:avLst/>
+          </a:prstGeom>
+          <a:noFill/>
+        </p:spPr>
+        <p:txBody>
+          <a:bodyPr wrap="none" rtlCol="0">
+            <a:spAutoFit/>
+          </a:bodyPr>
+          <a:lstStyle/>
+          <a:p>
+            <a:pPr algn="ctr"/>
+            <a:r>
+              <a:rPr lang="en-US" b="1" dirty="0" smtClean="0"/>
+              <a:t>SELECTION</a:t>
+            </a:r>
+            <a:endParaRPr lang="en-US" b="1" dirty="0"/>
+          </a:p>
+        </p:txBody>
+      </p:sp>
+      <p:sp>
+        <p:nvSpPr>
+          <p:cNvPr id="100" name="TextBox 99"/>
+          <p:cNvSpPr txBox="1"/>
+          <p:nvPr/>
+        </p:nvSpPr>
+        <p:spPr>
+          <a:xfrm>
+            <a:off x="4010297" y="3190513"/>
+            <a:ext cx="556838" cy="369332"/>
+          </a:xfrm>
+          <a:prstGeom prst="rect">
+            <a:avLst/>
+          </a:prstGeom>
+          <a:noFill/>
+        </p:spPr>
+        <p:txBody>
+          <a:bodyPr wrap="none" rtlCol="0">
+            <a:spAutoFit/>
+          </a:bodyPr>
+          <a:lstStyle/>
+          <a:p>
+            <a:r>
+              <a:rPr lang="en-US" dirty="0" smtClean="0"/>
+              <a:t>Tap</a:t>
+            </a:r>
+            <a:endParaRPr lang="en-US" dirty="0"/>
+          </a:p>
+        </p:txBody>
+      </p:sp>
+      <p:cxnSp>
+        <p:nvCxnSpPr>
+          <p:cNvPr id="44" name="Straight Arrow Connector 43"/>
+          <p:cNvCxnSpPr/>
+          <p:nvPr/>
+        </p:nvCxnSpPr>
+        <p:spPr>
+          <a:xfrm flipH="1">
+            <a:off x="3793195" y="4005838"/>
+            <a:ext cx="704248" cy="0"/>
+          </a:xfrm>
+          <a:prstGeom prst="straightConnector1">
+            <a:avLst/>
+          </a:prstGeom>
+          <a:ln>
+            <a:tailEnd type="arrow"/>
+          </a:ln>
+        </p:spPr>
+        <p:style>
+          <a:lnRef idx="2">
+            <a:schemeClr val="accent1"/>
+          </a:lnRef>
+          <a:fillRef idx="0">
+            <a:schemeClr val="accent1"/>
+          </a:fillRef>
+          <a:effectRef idx="1">
+            <a:schemeClr val="accent1"/>
+          </a:effectRef>
+          <a:fontRef idx="minor">
+            <a:schemeClr val="tx1"/>
+          </a:fontRef>
+        </p:style>
+      </p:cxnSp>
+      <p:sp>
+        <p:nvSpPr>
+          <p:cNvPr id="45" name="TextBox 44"/>
+          <p:cNvSpPr txBox="1"/>
+          <p:nvPr/>
+        </p:nvSpPr>
+        <p:spPr>
+          <a:xfrm>
+            <a:off x="3776701" y="4005838"/>
+            <a:ext cx="813369" cy="646331"/>
+          </a:xfrm>
+          <a:prstGeom prst="rect">
+            <a:avLst/>
+          </a:prstGeom>
+          <a:noFill/>
+        </p:spPr>
+        <p:txBody>
+          <a:bodyPr wrap="none" rtlCol="0">
+            <a:spAutoFit/>
+          </a:bodyPr>
+          <a:lstStyle/>
+          <a:p>
+            <a:r>
+              <a:rPr lang="en-US" dirty="0" smtClean="0"/>
+              <a:t>Swipe</a:t>
+            </a:r>
+          </a:p>
+          <a:p>
+            <a:r>
+              <a:rPr lang="en-US" dirty="0" smtClean="0"/>
+              <a:t>down</a:t>
+            </a:r>
+            <a:endParaRPr lang="en-US" dirty="0"/>
+          </a:p>
+        </p:txBody>
+      </p:sp>
+    </p:spTree>
+    <p:extLst>
+      <p:ext uri="{BB962C8B-B14F-4D97-AF65-F5344CB8AC3E}">
+        <p14:creationId xmlns:p14="http://schemas.microsoft.com/office/powerpoint/2010/main" val="3190627928"/>
+      </p:ext>
+    </p:extLst>
+  </p:cSld>
+  <p:clrMapOvr>
+    <a:masterClrMapping/>
+  </p:clrMapOvr>
+</p:sld>
+</file>
+
+<file path=ppt/slides/slide2.xml><?xml version="1.0" encoding="utf-8"?>
+<p:sld xmlns:a="http://schemas.openxmlformats.org/drawingml/2006/main" xmlns:r="http://schemas.openxmlformats.org/officeDocument/2006/relationships" xmlns:p="http://schemas.openxmlformats.org/presentationml/2006/main">
+  <p:cSld>
+    <p:spTree>
+      <p:nvGrpSpPr>
+        <p:cNvPr id="1" name=""/>
+        <p:cNvGrpSpPr/>
+        <p:nvPr/>
+      </p:nvGrpSpPr>
+      <p:grpSpPr>
+        <a:xfrm>
+          <a:off x="0" y="0"/>
+          <a:ext cx="0" cy="0"/>
+          <a:chOff x="0" y="0"/>
+          <a:chExt cx="0" cy="0"/>
+        </a:xfrm>
+      </p:grpSpPr>
+      <p:sp>
+        <p:nvSpPr>
+          <p:cNvPr id="92" name="Rectangle 91"/>
+          <p:cNvSpPr/>
+          <p:nvPr/>
+        </p:nvSpPr>
+        <p:spPr>
+          <a:xfrm>
+            <a:off x="4497443" y="1629538"/>
+            <a:ext cx="4597897" cy="3956763"/>
+          </a:xfrm>
+          <a:prstGeom prst="rect">
+            <a:avLst/>
+          </a:prstGeom>
+        </p:spPr>
+        <p:style>
+          <a:lnRef idx="1">
+            <a:schemeClr val="accent1"/>
+          </a:lnRef>
+          <a:fillRef idx="2">
+            <a:schemeClr val="accent1"/>
+          </a:fillRef>
+          <a:effectRef idx="1">
+            <a:schemeClr val="accent1"/>
+          </a:effectRef>
+          <a:fontRef idx="minor">
+            <a:schemeClr val="dk1"/>
+          </a:fontRef>
+        </p:style>
+        <p:txBody>
+          <a:bodyPr rtlCol="0" anchor="ctr"/>
+          <a:lstStyle/>
+          <a:p>
+            <a:pPr algn="ctr"/>
+            <a:endParaRPr lang="en-US"/>
+          </a:p>
+        </p:txBody>
+      </p:sp>
+      <p:sp>
+        <p:nvSpPr>
+          <p:cNvPr id="35" name="Rectangle 34"/>
+          <p:cNvSpPr/>
+          <p:nvPr/>
+        </p:nvSpPr>
+        <p:spPr>
+          <a:xfrm>
+            <a:off x="356293" y="2638708"/>
+            <a:ext cx="3741702" cy="2521208"/>
+          </a:xfrm>
+          <a:prstGeom prst="rect">
+            <a:avLst/>
+          </a:prstGeom>
+        </p:spPr>
+        <p:style>
+          <a:lnRef idx="1">
+            <a:schemeClr val="accent1"/>
+          </a:lnRef>
+          <a:fillRef idx="2">
+            <a:schemeClr val="accent1"/>
+          </a:fillRef>
+          <a:effectRef idx="1">
+            <a:schemeClr val="accent1"/>
+          </a:effectRef>
+          <a:fontRef idx="minor">
+            <a:schemeClr val="dk1"/>
+          </a:fontRef>
+        </p:style>
+        <p:txBody>
+          <a:bodyPr rtlCol="0" anchor="ctr"/>
+          <a:lstStyle/>
+          <a:p>
+            <a:pPr algn="ctr"/>
+            <a:endParaRPr lang="en-US" dirty="0"/>
+          </a:p>
+        </p:txBody>
+      </p:sp>
+      <p:sp>
+        <p:nvSpPr>
+          <p:cNvPr id="34" name="Rectangle 33"/>
+          <p:cNvSpPr/>
+          <p:nvPr/>
+        </p:nvSpPr>
+        <p:spPr>
+          <a:xfrm>
+            <a:off x="203893" y="2486308"/>
+            <a:ext cx="3741702" cy="2521208"/>
+          </a:xfrm>
+          <a:prstGeom prst="rect">
+            <a:avLst/>
+          </a:prstGeom>
+        </p:spPr>
+        <p:style>
+          <a:lnRef idx="1">
+            <a:schemeClr val="accent1"/>
+          </a:lnRef>
+          <a:fillRef idx="2">
+            <a:schemeClr val="accent1"/>
+          </a:fillRef>
+          <a:effectRef idx="1">
+            <a:schemeClr val="accent1"/>
+          </a:effectRef>
+          <a:fontRef idx="minor">
+            <a:schemeClr val="dk1"/>
+          </a:fontRef>
+        </p:style>
+        <p:txBody>
+          <a:bodyPr rtlCol="0" anchor="ctr"/>
+          <a:lstStyle/>
+          <a:p>
+            <a:pPr algn="ctr"/>
+            <a:endParaRPr lang="en-US"/>
+          </a:p>
+        </p:txBody>
+      </p:sp>
+      <p:sp>
+        <p:nvSpPr>
+          <p:cNvPr id="83" name="Rectangle 82"/>
+          <p:cNvSpPr/>
+          <p:nvPr/>
+        </p:nvSpPr>
+        <p:spPr>
+          <a:xfrm>
+            <a:off x="51493" y="2333908"/>
+            <a:ext cx="3741702" cy="2521208"/>
+          </a:xfrm>
+          <a:prstGeom prst="rect">
+            <a:avLst/>
+          </a:prstGeom>
+        </p:spPr>
+        <p:style>
+          <a:lnRef idx="1">
+            <a:schemeClr val="accent1"/>
+          </a:lnRef>
+          <a:fillRef idx="2">
+            <a:schemeClr val="accent1"/>
+          </a:fillRef>
+          <a:effectRef idx="1">
+            <a:schemeClr val="accent1"/>
+          </a:effectRef>
+          <a:fontRef idx="minor">
+            <a:schemeClr val="dk1"/>
+          </a:fontRef>
+        </p:style>
+        <p:txBody>
+          <a:bodyPr rtlCol="0" anchor="ctr"/>
+          <a:lstStyle/>
+          <a:p>
+            <a:pPr algn="ctr"/>
+            <a:endParaRPr lang="en-US"/>
+          </a:p>
+        </p:txBody>
+      </p:sp>
+      <p:sp>
+        <p:nvSpPr>
+          <p:cNvPr id="2" name="Decision 1"/>
+          <p:cNvSpPr/>
+          <p:nvPr/>
+        </p:nvSpPr>
+        <p:spPr>
+          <a:xfrm>
+            <a:off x="841279" y="2858221"/>
+            <a:ext cx="2153576" cy="722890"/>
           </a:xfrm>
           <a:prstGeom prst="flowChartDecision">
+            <a:avLst/>
+          </a:prstGeom>
+        </p:spPr>
+        <p:style>
+          <a:lnRef idx="1">
+            <a:schemeClr val="dk1"/>
+          </a:lnRef>
+          <a:fillRef idx="2">
+            <a:schemeClr val="dk1"/>
+          </a:fillRef>
+          <a:effectRef idx="1">
+            <a:schemeClr val="dk1"/>
+          </a:effectRef>
+          <a:fontRef idx="minor">
+            <a:schemeClr val="dk1"/>
+          </a:fontRef>
+        </p:style>
+        <p:txBody>
+          <a:bodyPr rtlCol="0" anchor="ctr"/>
+          <a:lstStyle/>
+          <a:p>
+            <a:pPr algn="ctr"/>
+            <a:r>
+              <a:rPr lang="en-US" sz="1400" dirty="0" smtClean="0"/>
+              <a:t>Target received IR?</a:t>
+            </a:r>
+            <a:endParaRPr lang="en-US" sz="1400" dirty="0"/>
+          </a:p>
+        </p:txBody>
+      </p:sp>
+      <p:sp>
+        <p:nvSpPr>
+          <p:cNvPr id="3" name="Decision 2"/>
+          <p:cNvSpPr/>
+          <p:nvPr/>
+        </p:nvSpPr>
+        <p:spPr>
+          <a:xfrm>
+            <a:off x="4788689" y="1819075"/>
+            <a:ext cx="1716399" cy="1071068"/>
+          </a:xfrm>
+          <a:prstGeom prst="flowChartDecision">
+            <a:avLst/>
+          </a:prstGeom>
+        </p:spPr>
+        <p:style>
+          <a:lnRef idx="1">
+            <a:schemeClr val="dk1"/>
+          </a:lnRef>
+          <a:fillRef idx="2">
+            <a:schemeClr val="dk1"/>
+          </a:fillRef>
+          <a:effectRef idx="1">
+            <a:schemeClr val="dk1"/>
+          </a:effectRef>
+          <a:fontRef idx="minor">
+            <a:schemeClr val="dk1"/>
+          </a:fontRef>
+        </p:style>
+        <p:txBody>
+          <a:bodyPr rtlCol="0" anchor="ctr"/>
+          <a:lstStyle/>
+          <a:p>
+            <a:pPr algn="ctr"/>
+            <a:r>
+              <a:rPr lang="en-US" sz="1400" dirty="0" smtClean="0"/>
+              <a:t>Single target received IR?</a:t>
+            </a:r>
+            <a:endParaRPr lang="en-US" sz="1400" dirty="0"/>
+          </a:p>
+        </p:txBody>
+      </p:sp>
+      <p:sp>
+        <p:nvSpPr>
+          <p:cNvPr id="4" name="Rectangle 3"/>
+          <p:cNvSpPr/>
+          <p:nvPr/>
+        </p:nvSpPr>
+        <p:spPr>
+          <a:xfrm>
+            <a:off x="6713160" y="4218063"/>
+            <a:ext cx="1937389" cy="449755"/>
+          </a:xfrm>
+          <a:prstGeom prst="rect">
             <a:avLst/>
           </a:prstGeom>
         </p:spPr>
@@ -3409,6 +4508,59 @@
             <a:pPr algn="ctr"/>
             <a:r>
               <a:rPr lang="en-US" sz="1400" dirty="0" smtClean="0"/>
+              <a:t>Disambiguation </a:t>
+            </a:r>
+            <a:r>
+              <a:rPr lang="en-US" sz="1400" dirty="0" smtClean="0"/>
+              <a:t>UI</a:t>
+            </a:r>
+          </a:p>
+          <a:p>
+            <a:pPr algn="ctr"/>
+            <a:r>
+              <a:rPr lang="en-US" sz="1400" dirty="0" smtClean="0"/>
+              <a:t>(IR intensity ordered)</a:t>
+            </a:r>
+            <a:endParaRPr lang="en-US" sz="1400" dirty="0"/>
+          </a:p>
+        </p:txBody>
+      </p:sp>
+      <p:sp>
+        <p:nvSpPr>
+          <p:cNvPr id="5" name="Decision 4"/>
+          <p:cNvSpPr/>
+          <p:nvPr/>
+        </p:nvSpPr>
+        <p:spPr>
+          <a:xfrm>
+            <a:off x="5801881" y="3085849"/>
+            <a:ext cx="2175983" cy="750031"/>
+          </a:xfrm>
+          <a:prstGeom prst="flowChartDecision">
+            <a:avLst/>
+          </a:prstGeom>
+        </p:spPr>
+        <p:style>
+          <a:lnRef idx="1">
+            <a:schemeClr val="accent2"/>
+          </a:lnRef>
+          <a:fillRef idx="2">
+            <a:schemeClr val="accent2"/>
+          </a:fillRef>
+          <a:effectRef idx="1">
+            <a:schemeClr val="accent2"/>
+          </a:effectRef>
+          <a:fontRef idx="minor">
+            <a:schemeClr val="dk1"/>
+          </a:fontRef>
+        </p:style>
+        <p:txBody>
+          <a:bodyPr rtlCol="0" anchor="ctr"/>
+          <a:lstStyle/>
+          <a:p>
+            <a:pPr algn="ctr"/>
+            <a:r>
+              <a:rPr lang="en-US" sz="1400" dirty="0" smtClean="0"/>
               <a:t>IR intensity winner?</a:t>
             </a:r>
             <a:endParaRPr lang="en-US" sz="1400" dirty="0"/>
@@ -3534,8 +4686,8 @@
         </p:nvCxnSpPr>
         <p:spPr>
           <a:xfrm rot="5400000">
-            <a:off x="6594806" y="3704421"/>
-            <a:ext cx="271891" cy="2198684"/>
+            <a:off x="6520687" y="3778540"/>
+            <a:ext cx="271891" cy="2050446"/>
           </a:xfrm>
           <a:prstGeom prst="bentConnector3">
             <a:avLst>
@@ -3602,13 +4754,13 @@
         </p:nvCxnSpPr>
         <p:spPr>
           <a:xfrm flipH="1" flipV="1">
-            <a:off x="7830093" y="4218063"/>
-            <a:ext cx="820456" cy="224878"/>
+            <a:off x="7681855" y="4218063"/>
+            <a:ext cx="968694" cy="224878"/>
           </a:xfrm>
           <a:prstGeom prst="bentConnector4">
             <a:avLst>
-              <a:gd name="adj1" fmla="val -27863"/>
-              <a:gd name="adj2" fmla="val 140605"/>
+              <a:gd name="adj1" fmla="val -23599"/>
+              <a:gd name="adj2" fmla="val 201655"/>
             </a:avLst>
           </a:prstGeom>
           <a:ln>
@@ -3677,8 +4829,8 @@
         </p:nvCxnSpPr>
         <p:spPr>
           <a:xfrm rot="16200000" flipH="1">
-            <a:off x="7168892" y="3556861"/>
-            <a:ext cx="382183" cy="940220"/>
+            <a:off x="7094773" y="3630980"/>
+            <a:ext cx="382183" cy="791982"/>
           </a:xfrm>
           <a:prstGeom prst="bentConnector3">
             <a:avLst/>
@@ -4290,10 +5442,79 @@
           </a:p>
         </p:txBody>
       </p:sp>
+      <p:cxnSp>
+        <p:nvCxnSpPr>
+          <p:cNvPr id="38" name="Straight Arrow Connector 37"/>
+          <p:cNvCxnSpPr/>
+          <p:nvPr/>
+        </p:nvCxnSpPr>
+        <p:spPr>
+          <a:xfrm flipH="1">
+            <a:off x="3793195" y="3890373"/>
+            <a:ext cx="704248" cy="0"/>
+          </a:xfrm>
+          <a:prstGeom prst="straightConnector1">
+            <a:avLst/>
+          </a:prstGeom>
+          <a:ln>
+            <a:tailEnd type="arrow"/>
+          </a:ln>
+        </p:spPr>
+        <p:style>
+          <a:lnRef idx="2">
+            <a:schemeClr val="accent1"/>
+          </a:lnRef>
+          <a:fillRef idx="0">
+            <a:schemeClr val="accent1"/>
+          </a:fillRef>
+          <a:effectRef idx="1">
+            <a:schemeClr val="accent1"/>
+          </a:effectRef>
+          <a:fontRef idx="minor">
+            <a:schemeClr val="tx1"/>
+          </a:fontRef>
+        </p:style>
+      </p:cxnSp>
+      <p:sp>
+        <p:nvSpPr>
+          <p:cNvPr id="19" name="TextBox 18"/>
+          <p:cNvSpPr txBox="1"/>
+          <p:nvPr/>
+        </p:nvSpPr>
+        <p:spPr>
+          <a:xfrm>
+            <a:off x="3776701" y="3890373"/>
+            <a:ext cx="813369" cy="646331"/>
+          </a:xfrm>
+          <a:prstGeom prst="rect">
+            <a:avLst/>
+          </a:prstGeom>
+          <a:noFill/>
+        </p:spPr>
+        <p:txBody>
+          <a:bodyPr wrap="none" rtlCol="0">
+            <a:spAutoFit/>
+          </a:bodyPr>
+          <a:lstStyle/>
+          <a:p>
+            <a:r>
+              <a:rPr lang="en-US" dirty="0" smtClean="0"/>
+              <a:t>Swipe</a:t>
+            </a:r>
+          </a:p>
+          <a:p>
+            <a:r>
+              <a:rPr lang="en-US" dirty="0" smtClean="0"/>
+              <a:t>down</a:t>
+            </a:r>
+            <a:endParaRPr lang="en-US" dirty="0"/>
+          </a:p>
+        </p:txBody>
+      </p:sp>
     </p:spTree>
     <p:extLst>
       <p:ext uri="{BB962C8B-B14F-4D97-AF65-F5344CB8AC3E}">
-        <p14:creationId xmlns:p14="http://schemas.microsoft.com/office/powerpoint/2010/main" val="3190627928"/>
+        <p14:creationId xmlns:p14="http://schemas.microsoft.com/office/powerpoint/2010/main" val="1827268868"/>
       </p:ext>
     </p:extLst>
   </p:cSld>

</xml_diff>

<commit_message>
a significant amount of new content and changes on papers
</commit_message>
<xml_diff>
--- a/doc/uist14/figures/selectflow.pptx
+++ b/doc/uist14/figures/selectflow.pptx
@@ -6,7 +6,8 @@
   </p:sldMasterIdLst>
   <p:sldIdLst>
     <p:sldId id="257" r:id="rId2"/>
-    <p:sldId id="258" r:id="rId3"/>
+    <p:sldId id="259" r:id="rId3"/>
+    <p:sldId id="258" r:id="rId4"/>
   </p:sldIdLst>
   <p:sldSz cx="9144000" cy="6858000" type="screen4x3"/>
   <p:notesSz cx="6858000" cy="9144000"/>
@@ -3326,19 +3327,11 @@
             <a:pPr algn="ctr"/>
             <a:r>
               <a:rPr lang="en-US" sz="1400" dirty="0" smtClean="0"/>
-              <a:t>Single </a:t>
-            </a:r>
-            <a:r>
-              <a:rPr lang="en-US" sz="1400" dirty="0" smtClean="0"/>
-              <a:t>target received </a:t>
+              <a:t>Single target received </a:t>
             </a:r>
             <a:r>
               <a:rPr lang="en-US" sz="1400" smtClean="0"/>
-              <a:t>IR</a:t>
-            </a:r>
-            <a:r>
-              <a:rPr lang="en-US" sz="1400" smtClean="0"/>
-              <a:t>?</a:t>
+              <a:t>IR?</a:t>
             </a:r>
             <a:endParaRPr lang="en-US" sz="1400" dirty="0"/>
           </a:p>
@@ -3380,11 +3373,7 @@
             <a:pPr algn="ctr"/>
             <a:r>
               <a:rPr lang="en-US" sz="1400" dirty="0" smtClean="0"/>
-              <a:t>Disambiguation </a:t>
-            </a:r>
-            <a:r>
-              <a:rPr lang="en-US" sz="1400" dirty="0" smtClean="0"/>
-              <a:t>UI</a:t>
+              <a:t>Disambiguation UI</a:t>
             </a:r>
           </a:p>
           <a:p>
@@ -4238,6 +4227,633 @@
       </p:grpSpPr>
       <p:sp>
         <p:nvSpPr>
+          <p:cNvPr id="23" name="Rounded Rectangle 22"/>
+          <p:cNvSpPr/>
+          <p:nvPr/>
+        </p:nvSpPr>
+        <p:spPr>
+          <a:xfrm>
+            <a:off x="199572" y="2665003"/>
+            <a:ext cx="1034143" cy="570774"/>
+          </a:xfrm>
+          <a:prstGeom prst="roundRect">
+            <a:avLst/>
+          </a:prstGeom>
+          <a:solidFill>
+            <a:srgbClr val="BFBFBF"/>
+          </a:solidFill>
+          <a:ln>
+            <a:solidFill>
+              <a:schemeClr val="bg1">
+                <a:lumMod val="75000"/>
+              </a:schemeClr>
+            </a:solidFill>
+          </a:ln>
+          <a:effectLst/>
+        </p:spPr>
+        <p:style>
+          <a:lnRef idx="1">
+            <a:schemeClr val="accent1"/>
+          </a:lnRef>
+          <a:fillRef idx="3">
+            <a:schemeClr val="accent1"/>
+          </a:fillRef>
+          <a:effectRef idx="2">
+            <a:schemeClr val="accent1"/>
+          </a:effectRef>
+          <a:fontRef idx="minor">
+            <a:schemeClr val="lt1"/>
+          </a:fontRef>
+        </p:style>
+        <p:txBody>
+          <a:bodyPr rtlCol="0" anchor="ctr"/>
+          <a:lstStyle/>
+          <a:p>
+            <a:pPr algn="ctr"/>
+            <a:r>
+              <a:rPr lang="en-US" dirty="0">
+                <a:latin typeface="Segoe Light"/>
+                <a:cs typeface="Segoe Light"/>
+              </a:rPr>
+              <a:t>Scan</a:t>
+            </a:r>
+            <a:endParaRPr lang="en-US" dirty="0"/>
+          </a:p>
+        </p:txBody>
+      </p:sp>
+      <p:sp>
+        <p:nvSpPr>
+          <p:cNvPr id="50" name="Rounded Rectangle 49"/>
+          <p:cNvSpPr/>
+          <p:nvPr/>
+        </p:nvSpPr>
+        <p:spPr>
+          <a:xfrm>
+            <a:off x="2137519" y="2665003"/>
+            <a:ext cx="1034143" cy="570774"/>
+          </a:xfrm>
+          <a:prstGeom prst="roundRect">
+            <a:avLst/>
+          </a:prstGeom>
+          <a:solidFill>
+            <a:srgbClr val="BFBFBF"/>
+          </a:solidFill>
+          <a:ln>
+            <a:solidFill>
+              <a:schemeClr val="bg1">
+                <a:lumMod val="75000"/>
+              </a:schemeClr>
+            </a:solidFill>
+          </a:ln>
+          <a:effectLst/>
+        </p:spPr>
+        <p:style>
+          <a:lnRef idx="1">
+            <a:schemeClr val="accent1"/>
+          </a:lnRef>
+          <a:fillRef idx="3">
+            <a:schemeClr val="accent1"/>
+          </a:fillRef>
+          <a:effectRef idx="2">
+            <a:schemeClr val="accent1"/>
+          </a:effectRef>
+          <a:fontRef idx="minor">
+            <a:schemeClr val="lt1"/>
+          </a:fontRef>
+        </p:style>
+        <p:txBody>
+          <a:bodyPr rtlCol="0" anchor="ctr"/>
+          <a:lstStyle/>
+          <a:p>
+            <a:pPr algn="ctr"/>
+            <a:r>
+              <a:rPr lang="en-US" dirty="0" smtClean="0">
+                <a:latin typeface="Segoe Light"/>
+                <a:cs typeface="Segoe Light"/>
+              </a:rPr>
+              <a:t>Coarse</a:t>
+            </a:r>
+            <a:endParaRPr lang="en-US" dirty="0"/>
+          </a:p>
+        </p:txBody>
+      </p:sp>
+      <p:sp>
+        <p:nvSpPr>
+          <p:cNvPr id="51" name="Rounded Rectangle 50"/>
+          <p:cNvSpPr/>
+          <p:nvPr/>
+        </p:nvSpPr>
+        <p:spPr>
+          <a:xfrm>
+            <a:off x="4209481" y="2671353"/>
+            <a:ext cx="1477305" cy="570774"/>
+          </a:xfrm>
+          <a:prstGeom prst="roundRect">
+            <a:avLst/>
+          </a:prstGeom>
+          <a:solidFill>
+            <a:srgbClr val="BFBFBF"/>
+          </a:solidFill>
+          <a:ln>
+            <a:solidFill>
+              <a:schemeClr val="bg1">
+                <a:lumMod val="75000"/>
+              </a:schemeClr>
+            </a:solidFill>
+          </a:ln>
+          <a:effectLst/>
+        </p:spPr>
+        <p:style>
+          <a:lnRef idx="1">
+            <a:schemeClr val="accent1"/>
+          </a:lnRef>
+          <a:fillRef idx="3">
+            <a:schemeClr val="accent1"/>
+          </a:fillRef>
+          <a:effectRef idx="2">
+            <a:schemeClr val="accent1"/>
+          </a:effectRef>
+          <a:fontRef idx="minor">
+            <a:schemeClr val="lt1"/>
+          </a:fontRef>
+        </p:style>
+        <p:txBody>
+          <a:bodyPr rtlCol="0" anchor="ctr"/>
+          <a:lstStyle/>
+          <a:p>
+            <a:pPr algn="ctr"/>
+            <a:r>
+              <a:rPr lang="en-US" dirty="0" smtClean="0">
+                <a:latin typeface="Segoe Light"/>
+                <a:cs typeface="Segoe Light"/>
+              </a:rPr>
+              <a:t>Refinement</a:t>
+            </a:r>
+            <a:endParaRPr lang="en-US" dirty="0"/>
+          </a:p>
+        </p:txBody>
+      </p:sp>
+      <p:sp>
+        <p:nvSpPr>
+          <p:cNvPr id="52" name="Rounded Rectangle 51"/>
+          <p:cNvSpPr/>
+          <p:nvPr/>
+        </p:nvSpPr>
+        <p:spPr>
+          <a:xfrm>
+            <a:off x="6472800" y="2680423"/>
+            <a:ext cx="1237914" cy="570774"/>
+          </a:xfrm>
+          <a:prstGeom prst="roundRect">
+            <a:avLst/>
+          </a:prstGeom>
+          <a:solidFill>
+            <a:srgbClr val="BFBFBF"/>
+          </a:solidFill>
+          <a:ln>
+            <a:solidFill>
+              <a:schemeClr val="bg1">
+                <a:lumMod val="75000"/>
+              </a:schemeClr>
+            </a:solidFill>
+          </a:ln>
+          <a:effectLst/>
+        </p:spPr>
+        <p:style>
+          <a:lnRef idx="1">
+            <a:schemeClr val="accent1"/>
+          </a:lnRef>
+          <a:fillRef idx="3">
+            <a:schemeClr val="accent1"/>
+          </a:fillRef>
+          <a:effectRef idx="2">
+            <a:schemeClr val="accent1"/>
+          </a:effectRef>
+          <a:fontRef idx="minor">
+            <a:schemeClr val="lt1"/>
+          </a:fontRef>
+        </p:style>
+        <p:txBody>
+          <a:bodyPr rtlCol="0" anchor="ctr"/>
+          <a:lstStyle/>
+          <a:p>
+            <a:pPr algn="ctr"/>
+            <a:r>
+              <a:rPr lang="en-US" dirty="0" smtClean="0">
+                <a:latin typeface="Segoe Light"/>
+                <a:cs typeface="Segoe Light"/>
+              </a:rPr>
+              <a:t>Acquired</a:t>
+            </a:r>
+            <a:endParaRPr lang="en-US" dirty="0"/>
+          </a:p>
+        </p:txBody>
+      </p:sp>
+      <p:cxnSp>
+        <p:nvCxnSpPr>
+          <p:cNvPr id="53" name="Straight Arrow Connector 52"/>
+          <p:cNvCxnSpPr>
+            <a:stCxn id="23" idx="3"/>
+            <a:endCxn id="50" idx="1"/>
+          </p:cNvCxnSpPr>
+          <p:nvPr/>
+        </p:nvCxnSpPr>
+        <p:spPr>
+          <a:xfrm>
+            <a:off x="1233715" y="2950390"/>
+            <a:ext cx="903804" cy="0"/>
+          </a:xfrm>
+          <a:prstGeom prst="straightConnector1">
+            <a:avLst/>
+          </a:prstGeom>
+          <a:ln>
+            <a:solidFill>
+              <a:schemeClr val="tx1"/>
+            </a:solidFill>
+            <a:tailEnd type="arrow"/>
+          </a:ln>
+          <a:effectLst/>
+        </p:spPr>
+        <p:style>
+          <a:lnRef idx="2">
+            <a:schemeClr val="accent1"/>
+          </a:lnRef>
+          <a:fillRef idx="0">
+            <a:schemeClr val="accent1"/>
+          </a:fillRef>
+          <a:effectRef idx="1">
+            <a:schemeClr val="accent1"/>
+          </a:effectRef>
+          <a:fontRef idx="minor">
+            <a:schemeClr val="tx1"/>
+          </a:fontRef>
+        </p:style>
+      </p:cxnSp>
+      <p:cxnSp>
+        <p:nvCxnSpPr>
+          <p:cNvPr id="56" name="Straight Arrow Connector 55"/>
+          <p:cNvCxnSpPr>
+            <a:stCxn id="50" idx="3"/>
+            <a:endCxn id="51" idx="1"/>
+          </p:cNvCxnSpPr>
+          <p:nvPr/>
+        </p:nvCxnSpPr>
+        <p:spPr>
+          <a:xfrm>
+            <a:off x="3171662" y="2950390"/>
+            <a:ext cx="1037819" cy="6350"/>
+          </a:xfrm>
+          <a:prstGeom prst="straightConnector1">
+            <a:avLst/>
+          </a:prstGeom>
+          <a:ln>
+            <a:solidFill>
+              <a:schemeClr val="tx1"/>
+            </a:solidFill>
+            <a:tailEnd type="arrow"/>
+          </a:ln>
+          <a:effectLst/>
+        </p:spPr>
+        <p:style>
+          <a:lnRef idx="2">
+            <a:schemeClr val="accent1"/>
+          </a:lnRef>
+          <a:fillRef idx="0">
+            <a:schemeClr val="accent1"/>
+          </a:fillRef>
+          <a:effectRef idx="1">
+            <a:schemeClr val="accent1"/>
+          </a:effectRef>
+          <a:fontRef idx="minor">
+            <a:schemeClr val="tx1"/>
+          </a:fontRef>
+        </p:style>
+      </p:cxnSp>
+      <p:cxnSp>
+        <p:nvCxnSpPr>
+          <p:cNvPr id="59" name="Straight Arrow Connector 58"/>
+          <p:cNvCxnSpPr>
+            <a:stCxn id="51" idx="3"/>
+            <a:endCxn id="52" idx="1"/>
+          </p:cNvCxnSpPr>
+          <p:nvPr/>
+        </p:nvCxnSpPr>
+        <p:spPr>
+          <a:xfrm>
+            <a:off x="5686786" y="2956740"/>
+            <a:ext cx="786014" cy="9070"/>
+          </a:xfrm>
+          <a:prstGeom prst="straightConnector1">
+            <a:avLst/>
+          </a:prstGeom>
+          <a:ln>
+            <a:solidFill>
+              <a:schemeClr val="tx1"/>
+            </a:solidFill>
+            <a:tailEnd type="arrow"/>
+          </a:ln>
+          <a:effectLst/>
+        </p:spPr>
+        <p:style>
+          <a:lnRef idx="2">
+            <a:schemeClr val="accent1"/>
+          </a:lnRef>
+          <a:fillRef idx="0">
+            <a:schemeClr val="accent1"/>
+          </a:fillRef>
+          <a:effectRef idx="1">
+            <a:schemeClr val="accent1"/>
+          </a:effectRef>
+          <a:fontRef idx="minor">
+            <a:schemeClr val="tx1"/>
+          </a:fontRef>
+        </p:style>
+      </p:cxnSp>
+      <p:sp>
+        <p:nvSpPr>
+          <p:cNvPr id="63" name="TextBox 62"/>
+          <p:cNvSpPr txBox="1"/>
+          <p:nvPr/>
+        </p:nvSpPr>
+        <p:spPr>
+          <a:xfrm>
+            <a:off x="1345994" y="2596478"/>
+            <a:ext cx="508823" cy="369332"/>
+          </a:xfrm>
+          <a:prstGeom prst="rect">
+            <a:avLst/>
+          </a:prstGeom>
+          <a:noFill/>
+        </p:spPr>
+        <p:txBody>
+          <a:bodyPr wrap="none" rtlCol="0">
+            <a:spAutoFit/>
+          </a:bodyPr>
+          <a:lstStyle/>
+          <a:p>
+            <a:r>
+              <a:rPr lang="en-US" dirty="0" smtClean="0">
+                <a:latin typeface="Segoe Light"/>
+                <a:cs typeface="Segoe Light"/>
+              </a:rPr>
+              <a:t>Tap</a:t>
+            </a:r>
+            <a:endParaRPr lang="en-US" dirty="0">
+              <a:latin typeface="Segoe Light"/>
+              <a:cs typeface="Segoe Light"/>
+            </a:endParaRPr>
+          </a:p>
+        </p:txBody>
+      </p:sp>
+      <p:cxnSp>
+        <p:nvCxnSpPr>
+          <p:cNvPr id="72" name="Elbow Connector 71"/>
+          <p:cNvCxnSpPr>
+            <a:stCxn id="50" idx="2"/>
+            <a:endCxn id="52" idx="2"/>
+          </p:cNvCxnSpPr>
+          <p:nvPr/>
+        </p:nvCxnSpPr>
+        <p:spPr>
+          <a:xfrm rot="16200000" flipH="1">
+            <a:off x="4865464" y="1024904"/>
+            <a:ext cx="15420" cy="4437166"/>
+          </a:xfrm>
+          <a:prstGeom prst="bentConnector3">
+            <a:avLst>
+              <a:gd name="adj1" fmla="val 1582490"/>
+            </a:avLst>
+          </a:prstGeom>
+          <a:ln>
+            <a:solidFill>
+              <a:srgbClr val="000000"/>
+            </a:solidFill>
+            <a:tailEnd type="arrow"/>
+          </a:ln>
+          <a:effectLst/>
+        </p:spPr>
+        <p:style>
+          <a:lnRef idx="2">
+            <a:schemeClr val="accent1"/>
+          </a:lnRef>
+          <a:fillRef idx="0">
+            <a:schemeClr val="accent1"/>
+          </a:fillRef>
+          <a:effectRef idx="1">
+            <a:schemeClr val="accent1"/>
+          </a:effectRef>
+          <a:fontRef idx="minor">
+            <a:schemeClr val="tx1"/>
+          </a:fontRef>
+        </p:style>
+      </p:cxnSp>
+      <p:sp>
+        <p:nvSpPr>
+          <p:cNvPr id="82" name="TextBox 81"/>
+          <p:cNvSpPr txBox="1"/>
+          <p:nvPr/>
+        </p:nvSpPr>
+        <p:spPr>
+          <a:xfrm>
+            <a:off x="4455682" y="3492735"/>
+            <a:ext cx="753168" cy="523220"/>
+          </a:xfrm>
+          <a:prstGeom prst="rect">
+            <a:avLst/>
+          </a:prstGeom>
+          <a:noFill/>
+        </p:spPr>
+        <p:txBody>
+          <a:bodyPr wrap="none" rtlCol="0">
+            <a:spAutoFit/>
+          </a:bodyPr>
+          <a:lstStyle/>
+          <a:p>
+            <a:r>
+              <a:rPr lang="en-US" sz="1400" dirty="0">
+                <a:latin typeface="Segoe Light"/>
+                <a:cs typeface="Segoe Light"/>
+              </a:rPr>
+              <a:t>a</a:t>
+            </a:r>
+            <a:r>
+              <a:rPr lang="en-US" sz="1400" dirty="0" smtClean="0">
+                <a:latin typeface="Segoe Light"/>
+                <a:cs typeface="Segoe Light"/>
+              </a:rPr>
+              <a:t> single </a:t>
+            </a:r>
+          </a:p>
+          <a:p>
+            <a:r>
+              <a:rPr lang="en-US" sz="1400" dirty="0" smtClean="0">
+                <a:latin typeface="Segoe Light"/>
+                <a:cs typeface="Segoe Light"/>
+              </a:rPr>
+              <a:t>target?</a:t>
+            </a:r>
+            <a:endParaRPr lang="en-US" sz="1400" dirty="0">
+              <a:latin typeface="Segoe Light"/>
+              <a:cs typeface="Segoe Light"/>
+            </a:endParaRPr>
+          </a:p>
+        </p:txBody>
+      </p:sp>
+      <p:sp>
+        <p:nvSpPr>
+          <p:cNvPr id="85" name="TextBox 84"/>
+          <p:cNvSpPr txBox="1"/>
+          <p:nvPr/>
+        </p:nvSpPr>
+        <p:spPr>
+          <a:xfrm>
+            <a:off x="3253305" y="2431185"/>
+            <a:ext cx="787395" cy="523220"/>
+          </a:xfrm>
+          <a:prstGeom prst="rect">
+            <a:avLst/>
+          </a:prstGeom>
+          <a:noFill/>
+        </p:spPr>
+        <p:txBody>
+          <a:bodyPr wrap="none" rtlCol="0">
+            <a:spAutoFit/>
+          </a:bodyPr>
+          <a:lstStyle/>
+          <a:p>
+            <a:r>
+              <a:rPr lang="en-US" sz="1400" dirty="0" smtClean="0">
+                <a:latin typeface="Segoe Light"/>
+                <a:cs typeface="Segoe Light"/>
+              </a:rPr>
+              <a:t>multiple </a:t>
+            </a:r>
+          </a:p>
+          <a:p>
+            <a:r>
+              <a:rPr lang="en-US" sz="1400" dirty="0" smtClean="0">
+                <a:latin typeface="Segoe Light"/>
+                <a:cs typeface="Segoe Light"/>
+              </a:rPr>
+              <a:t>targets?</a:t>
+            </a:r>
+            <a:endParaRPr lang="en-US" sz="1400" dirty="0">
+              <a:latin typeface="Segoe Light"/>
+              <a:cs typeface="Segoe Light"/>
+            </a:endParaRPr>
+          </a:p>
+        </p:txBody>
+      </p:sp>
+      <p:cxnSp>
+        <p:nvCxnSpPr>
+          <p:cNvPr id="86" name="Elbow Connector 85"/>
+          <p:cNvCxnSpPr>
+            <a:stCxn id="52" idx="0"/>
+            <a:endCxn id="23" idx="0"/>
+          </p:cNvCxnSpPr>
+          <p:nvPr/>
+        </p:nvCxnSpPr>
+        <p:spPr>
+          <a:xfrm rot="16200000" flipV="1">
+            <a:off x="3896491" y="-514844"/>
+            <a:ext cx="15420" cy="6375113"/>
+          </a:xfrm>
+          <a:prstGeom prst="bentConnector3">
+            <a:avLst>
+              <a:gd name="adj1" fmla="val 3170875"/>
+            </a:avLst>
+          </a:prstGeom>
+          <a:ln>
+            <a:solidFill>
+              <a:srgbClr val="000000"/>
+            </a:solidFill>
+            <a:tailEnd type="arrow"/>
+          </a:ln>
+          <a:effectLst/>
+        </p:spPr>
+        <p:style>
+          <a:lnRef idx="2">
+            <a:schemeClr val="accent1"/>
+          </a:lnRef>
+          <a:fillRef idx="0">
+            <a:schemeClr val="accent1"/>
+          </a:fillRef>
+          <a:effectRef idx="1">
+            <a:schemeClr val="accent1"/>
+          </a:effectRef>
+          <a:fontRef idx="minor">
+            <a:schemeClr val="tx1"/>
+          </a:fontRef>
+        </p:style>
+      </p:cxnSp>
+      <p:sp>
+        <p:nvSpPr>
+          <p:cNvPr id="88" name="TextBox 87"/>
+          <p:cNvSpPr txBox="1"/>
+          <p:nvPr/>
+        </p:nvSpPr>
+        <p:spPr>
+          <a:xfrm>
+            <a:off x="3109435" y="1798193"/>
+            <a:ext cx="1379195" cy="369332"/>
+          </a:xfrm>
+          <a:prstGeom prst="rect">
+            <a:avLst/>
+          </a:prstGeom>
+          <a:noFill/>
+        </p:spPr>
+        <p:txBody>
+          <a:bodyPr wrap="square" rtlCol="0">
+            <a:spAutoFit/>
+          </a:bodyPr>
+          <a:lstStyle/>
+          <a:p>
+            <a:r>
+              <a:rPr lang="en-US" dirty="0" smtClean="0">
+                <a:latin typeface="Segoe Light"/>
+                <a:cs typeface="Segoe Light"/>
+              </a:rPr>
+              <a:t>Swipe down</a:t>
+            </a:r>
+            <a:endParaRPr lang="en-US" dirty="0">
+              <a:latin typeface="Segoe Light"/>
+              <a:cs typeface="Segoe Light"/>
+            </a:endParaRPr>
+          </a:p>
+        </p:txBody>
+      </p:sp>
+    </p:spTree>
+    <p:extLst>
+      <p:ext uri="{BB962C8B-B14F-4D97-AF65-F5344CB8AC3E}">
+        <p14:creationId xmlns:p14="http://schemas.microsoft.com/office/powerpoint/2010/main" val="4253719767"/>
+      </p:ext>
+    </p:extLst>
+  </p:cSld>
+  <p:clrMapOvr>
+    <a:masterClrMapping/>
+  </p:clrMapOvr>
+</p:sld>
+</file>
+
+<file path=ppt/slides/slide3.xml><?xml version="1.0" encoding="utf-8"?>
+<p:sld xmlns:a="http://schemas.openxmlformats.org/drawingml/2006/main" xmlns:r="http://schemas.openxmlformats.org/officeDocument/2006/relationships" xmlns:p="http://schemas.openxmlformats.org/presentationml/2006/main">
+  <p:cSld>
+    <p:spTree>
+      <p:nvGrpSpPr>
+        <p:cNvPr id="1" name=""/>
+        <p:cNvGrpSpPr/>
+        <p:nvPr/>
+      </p:nvGrpSpPr>
+      <p:grpSpPr>
+        <a:xfrm>
+          <a:off x="0" y="0"/>
+          <a:ext cx="0" cy="0"/>
+          <a:chOff x="0" y="0"/>
+          <a:chExt cx="0" cy="0"/>
+        </a:xfrm>
+      </p:grpSpPr>
+      <p:sp>
+        <p:nvSpPr>
           <p:cNvPr id="92" name="Rectangle 91"/>
           <p:cNvSpPr/>
           <p:nvPr/>
@@ -4508,11 +5124,7 @@
             <a:pPr algn="ctr"/>
             <a:r>
               <a:rPr lang="en-US" sz="1400" dirty="0" smtClean="0"/>
-              <a:t>Disambiguation </a:t>
-            </a:r>
-            <a:r>
-              <a:rPr lang="en-US" sz="1400" dirty="0" smtClean="0"/>
-              <a:t>UI</a:t>
+              <a:t>Disambiguation UI</a:t>
             </a:r>
           </a:p>
           <a:p>

</xml_diff>